<commit_message>
내용 수정, File rename
</commit_message>
<xml_diff>
--- a/Sleeping analysis 2주차.pptx
+++ b/Sleeping analysis 2주차.pptx
@@ -309,7 +309,7 @@
           <a:p>
             <a:fld id="{1AC90F4A-AB0E-4670-89B1-A0DAF52731A9}" type="datetimeFigureOut">
               <a:rPr lang="ko-KR" altLang="en-US" smtClean="0"/>
-              <a:t>2019-11-22</a:t>
+              <a:t>2019-11-25</a:t>
             </a:fld>
             <a:endParaRPr lang="ko-KR" altLang="en-US"/>
           </a:p>
@@ -474,7 +474,7 @@
           <a:p>
             <a:fld id="{1AC90F4A-AB0E-4670-89B1-A0DAF52731A9}" type="datetimeFigureOut">
               <a:rPr lang="ko-KR" altLang="en-US" smtClean="0"/>
-              <a:t>2019-11-22</a:t>
+              <a:t>2019-11-25</a:t>
             </a:fld>
             <a:endParaRPr lang="ko-KR" altLang="en-US"/>
           </a:p>
@@ -649,7 +649,7 @@
           <a:p>
             <a:fld id="{1AC90F4A-AB0E-4670-89B1-A0DAF52731A9}" type="datetimeFigureOut">
               <a:rPr lang="ko-KR" altLang="en-US" smtClean="0"/>
-              <a:t>2019-11-22</a:t>
+              <a:t>2019-11-25</a:t>
             </a:fld>
             <a:endParaRPr lang="ko-KR" altLang="en-US"/>
           </a:p>
@@ -814,7 +814,7 @@
           <a:p>
             <a:fld id="{1AC90F4A-AB0E-4670-89B1-A0DAF52731A9}" type="datetimeFigureOut">
               <a:rPr lang="ko-KR" altLang="en-US" smtClean="0"/>
-              <a:t>2019-11-22</a:t>
+              <a:t>2019-11-25</a:t>
             </a:fld>
             <a:endParaRPr lang="ko-KR" altLang="en-US"/>
           </a:p>
@@ -1055,7 +1055,7 @@
           <a:p>
             <a:fld id="{1AC90F4A-AB0E-4670-89B1-A0DAF52731A9}" type="datetimeFigureOut">
               <a:rPr lang="ko-KR" altLang="en-US" smtClean="0"/>
-              <a:t>2019-11-22</a:t>
+              <a:t>2019-11-25</a:t>
             </a:fld>
             <a:endParaRPr lang="ko-KR" altLang="en-US"/>
           </a:p>
@@ -1338,7 +1338,7 @@
           <a:p>
             <a:fld id="{1AC90F4A-AB0E-4670-89B1-A0DAF52731A9}" type="datetimeFigureOut">
               <a:rPr lang="ko-KR" altLang="en-US" smtClean="0"/>
-              <a:t>2019-11-22</a:t>
+              <a:t>2019-11-25</a:t>
             </a:fld>
             <a:endParaRPr lang="ko-KR" altLang="en-US"/>
           </a:p>
@@ -1755,7 +1755,7 @@
           <a:p>
             <a:fld id="{1AC90F4A-AB0E-4670-89B1-A0DAF52731A9}" type="datetimeFigureOut">
               <a:rPr lang="ko-KR" altLang="en-US" smtClean="0"/>
-              <a:t>2019-11-22</a:t>
+              <a:t>2019-11-25</a:t>
             </a:fld>
             <a:endParaRPr lang="ko-KR" altLang="en-US"/>
           </a:p>
@@ -1868,7 +1868,7 @@
           <a:p>
             <a:fld id="{1AC90F4A-AB0E-4670-89B1-A0DAF52731A9}" type="datetimeFigureOut">
               <a:rPr lang="ko-KR" altLang="en-US" smtClean="0"/>
-              <a:t>2019-11-22</a:t>
+              <a:t>2019-11-25</a:t>
             </a:fld>
             <a:endParaRPr lang="ko-KR" altLang="en-US"/>
           </a:p>
@@ -1958,7 +1958,7 @@
           <a:p>
             <a:fld id="{1AC90F4A-AB0E-4670-89B1-A0DAF52731A9}" type="datetimeFigureOut">
               <a:rPr lang="ko-KR" altLang="en-US" smtClean="0"/>
-              <a:t>2019-11-22</a:t>
+              <a:t>2019-11-25</a:t>
             </a:fld>
             <a:endParaRPr lang="ko-KR" altLang="en-US"/>
           </a:p>
@@ -2230,7 +2230,7 @@
           <a:p>
             <a:fld id="{1AC90F4A-AB0E-4670-89B1-A0DAF52731A9}" type="datetimeFigureOut">
               <a:rPr lang="ko-KR" altLang="en-US" smtClean="0"/>
-              <a:t>2019-11-22</a:t>
+              <a:t>2019-11-25</a:t>
             </a:fld>
             <a:endParaRPr lang="ko-KR" altLang="en-US"/>
           </a:p>
@@ -2478,7 +2478,7 @@
           <a:p>
             <a:fld id="{1AC90F4A-AB0E-4670-89B1-A0DAF52731A9}" type="datetimeFigureOut">
               <a:rPr lang="ko-KR" altLang="en-US" smtClean="0"/>
-              <a:t>2019-11-22</a:t>
+              <a:t>2019-11-25</a:t>
             </a:fld>
             <a:endParaRPr lang="ko-KR" altLang="en-US"/>
           </a:p>
@@ -2686,7 +2686,7 @@
           <a:p>
             <a:fld id="{1AC90F4A-AB0E-4670-89B1-A0DAF52731A9}" type="datetimeFigureOut">
               <a:rPr lang="ko-KR" altLang="en-US" smtClean="0"/>
-              <a:t>2019-11-22</a:t>
+              <a:t>2019-11-25</a:t>
             </a:fld>
             <a:endParaRPr lang="ko-KR" altLang="en-US"/>
           </a:p>
@@ -3778,7 +3778,7 @@
             </a:r>
             <a:r>
               <a:rPr lang="ko-KR" altLang="en-US" sz="2000" dirty="0" smtClean="0"/>
-              <a:t>축적</a:t>
+              <a:t>관리</a:t>
             </a:r>
             <a:endParaRPr lang="ko-KR" altLang="en-US" sz="2000" dirty="0"/>
           </a:p>
@@ -3806,7 +3806,7 @@
         </p:blipFill>
         <p:spPr>
           <a:xfrm>
-            <a:off x="899592" y="3872754"/>
+            <a:off x="1115616" y="4082587"/>
             <a:ext cx="2857500" cy="1028700"/>
           </a:xfrm>
           <a:prstGeom prst="rect">
@@ -3837,7 +3837,7 @@
         </p:blipFill>
         <p:spPr bwMode="auto">
           <a:xfrm>
-            <a:off x="5508104" y="4005064"/>
+            <a:off x="6084168" y="4082587"/>
             <a:ext cx="1728192" cy="1034215"/>
           </a:xfrm>
           <a:prstGeom prst="rect">

</xml_diff>